<commit_message>
Edit Chapter03 course material
</commit_message>
<xml_diff>
--- a/Course Materials/Chapter03_Pytorch_Basics.pptx
+++ b/Course Materials/Chapter03_Pytorch_Basics.pptx
@@ -256,7 +256,7 @@
           <a:p>
             <a:fld id="{860E4C0E-3822-4470-875C-25F6E634D1E2}" type="datetimeFigureOut">
               <a:rPr lang="ko-KR" altLang="en-US" smtClean="0"/>
-              <a:t>2021-10-21</a:t>
+              <a:t>2021-11-04</a:t>
             </a:fld>
             <a:endParaRPr lang="ko-KR" altLang="en-US"/>
           </a:p>
@@ -674,7 +674,7 @@
           <a:p>
             <a:fld id="{3D067A03-45D1-4EAE-8DA0-F79B7BEE625A}" type="datetimeFigureOut">
               <a:rPr lang="ko-KR" altLang="en-US" smtClean="0"/>
-              <a:t>2021-10-21</a:t>
+              <a:t>2021-11-04</a:t>
             </a:fld>
             <a:endParaRPr lang="ko-KR" altLang="en-US"/>
           </a:p>
@@ -1398,7 +1398,7 @@
           <a:p>
             <a:fld id="{3D067A03-45D1-4EAE-8DA0-F79B7BEE625A}" type="datetimeFigureOut">
               <a:rPr lang="ko-KR" altLang="en-US" smtClean="0"/>
-              <a:t>2021-10-21</a:t>
+              <a:t>2021-11-04</a:t>
             </a:fld>
             <a:endParaRPr lang="ko-KR" altLang="en-US"/>
           </a:p>
@@ -1989,7 +1989,7 @@
           <a:p>
             <a:fld id="{3D067A03-45D1-4EAE-8DA0-F79B7BEE625A}" type="datetimeFigureOut">
               <a:rPr lang="ko-KR" altLang="en-US" smtClean="0"/>
-              <a:t>2021-10-21</a:t>
+              <a:t>2021-11-04</a:t>
             </a:fld>
             <a:endParaRPr lang="ko-KR" altLang="en-US"/>
           </a:p>
@@ -2505,7 +2505,7 @@
           <a:p>
             <a:fld id="{3D067A03-45D1-4EAE-8DA0-F79B7BEE625A}" type="datetimeFigureOut">
               <a:rPr lang="ko-KR" altLang="en-US" smtClean="0"/>
-              <a:t>2021-10-21</a:t>
+              <a:t>2021-11-04</a:t>
             </a:fld>
             <a:endParaRPr lang="ko-KR" altLang="en-US"/>
           </a:p>
@@ -3117,7 +3117,7 @@
           <a:p>
             <a:fld id="{3D067A03-45D1-4EAE-8DA0-F79B7BEE625A}" type="datetimeFigureOut">
               <a:rPr lang="ko-KR" altLang="en-US" smtClean="0"/>
-              <a:t>2021-10-21</a:t>
+              <a:t>2021-11-04</a:t>
             </a:fld>
             <a:endParaRPr lang="ko-KR" altLang="en-US"/>
           </a:p>
@@ -3771,7 +3771,7 @@
           <a:p>
             <a:fld id="{3D067A03-45D1-4EAE-8DA0-F79B7BEE625A}" type="datetimeFigureOut">
               <a:rPr lang="ko-KR" altLang="en-US" smtClean="0"/>
-              <a:t>2021-10-21</a:t>
+              <a:t>2021-11-04</a:t>
             </a:fld>
             <a:endParaRPr lang="ko-KR" altLang="en-US"/>
           </a:p>
@@ -4419,7 +4419,7 @@
           <a:p>
             <a:fld id="{3D067A03-45D1-4EAE-8DA0-F79B7BEE625A}" type="datetimeFigureOut">
               <a:rPr lang="ko-KR" altLang="en-US" smtClean="0"/>
-              <a:t>2021-10-21</a:t>
+              <a:t>2021-11-04</a:t>
             </a:fld>
             <a:endParaRPr lang="ko-KR" altLang="en-US"/>
           </a:p>
@@ -5214,7 +5214,7 @@
           <a:p>
             <a:fld id="{3D067A03-45D1-4EAE-8DA0-F79B7BEE625A}" type="datetimeFigureOut">
               <a:rPr lang="ko-KR" altLang="en-US" smtClean="0"/>
-              <a:t>2021-10-21</a:t>
+              <a:t>2021-11-04</a:t>
             </a:fld>
             <a:endParaRPr lang="ko-KR" altLang="en-US"/>
           </a:p>
@@ -5738,7 +5738,7 @@
           <a:p>
             <a:fld id="{3D067A03-45D1-4EAE-8DA0-F79B7BEE625A}" type="datetimeFigureOut">
               <a:rPr lang="ko-KR" altLang="en-US" smtClean="0"/>
-              <a:t>2021-10-21</a:t>
+              <a:t>2021-11-04</a:t>
             </a:fld>
             <a:endParaRPr lang="ko-KR" altLang="en-US"/>
           </a:p>
@@ -6226,7 +6226,7 @@
           <a:p>
             <a:fld id="{3D067A03-45D1-4EAE-8DA0-F79B7BEE625A}" type="datetimeFigureOut">
               <a:rPr lang="ko-KR" altLang="en-US" smtClean="0"/>
-              <a:t>2021-10-21</a:t>
+              <a:t>2021-11-04</a:t>
             </a:fld>
             <a:endParaRPr lang="ko-KR" altLang="en-US"/>
           </a:p>
@@ -6936,7 +6936,7 @@
           <a:p>
             <a:fld id="{3D067A03-45D1-4EAE-8DA0-F79B7BEE625A}" type="datetimeFigureOut">
               <a:rPr lang="ko-KR" altLang="en-US" smtClean="0"/>
-              <a:t>2021-10-21</a:t>
+              <a:t>2021-11-04</a:t>
             </a:fld>
             <a:endParaRPr lang="ko-KR" altLang="en-US"/>
           </a:p>
@@ -7603,7 +7603,7 @@
           <a:p>
             <a:fld id="{3D067A03-45D1-4EAE-8DA0-F79B7BEE625A}" type="datetimeFigureOut">
               <a:rPr lang="ko-KR" altLang="en-US" smtClean="0"/>
-              <a:t>2021-10-21</a:t>
+              <a:t>2021-11-04</a:t>
             </a:fld>
             <a:endParaRPr lang="ko-KR" altLang="en-US"/>
           </a:p>
@@ -8219,7 +8219,7 @@
           <a:p>
             <a:fld id="{3D067A03-45D1-4EAE-8DA0-F79B7BEE625A}" type="datetimeFigureOut">
               <a:rPr lang="ko-KR" altLang="en-US" smtClean="0"/>
-              <a:t>2021-10-21</a:t>
+              <a:t>2021-11-04</a:t>
             </a:fld>
             <a:endParaRPr lang="ko-KR" altLang="en-US"/>
           </a:p>
@@ -18321,7 +18321,7 @@
             <a:pPr lvl="1"/>
             <a:r>
               <a:rPr lang="en-US" altLang="ko-KR" dirty="0"/>
-              <a:t>Boston House Prices Dataset: </a:t>
+              <a:t>Boston Housing Dataset: </a:t>
             </a:r>
             <a:r>
               <a:rPr lang="ko-KR" altLang="en-US" dirty="0"/>
@@ -18332,11 +18332,15 @@
           <a:p>
             <a:pPr lvl="1"/>
             <a:r>
-              <a:rPr lang="en-US" altLang="ko-KR" dirty="0"/>
-              <a:t>Diabetes Dataset: </a:t>
-            </a:r>
-            <a:r>
-              <a:rPr lang="ko-KR" altLang="en-US"/>
+              <a:rPr lang="en-US" altLang="ko-KR"/>
+              <a:t>Diabetes Progression </a:t>
+            </a:r>
+            <a:r>
+              <a:rPr lang="en-US" altLang="ko-KR" dirty="0"/>
+              <a:t>Dataset: </a:t>
+            </a:r>
+            <a:r>
+              <a:rPr lang="ko-KR" altLang="en-US" dirty="0"/>
               <a:t>당뇨병 진행도 예측</a:t>
             </a:r>
             <a:endParaRPr lang="en-US" altLang="ko-KR" dirty="0"/>
@@ -19759,6 +19763,15 @@
 </file>
 
 <file path=customXml/item1.xml><?xml version="1.0" encoding="utf-8"?>
+<?mso-contentType ?>
+<FormTemplates xmlns="http://schemas.microsoft.com/sharepoint/v3/contenttype/forms">
+  <Display>DocumentLibraryForm</Display>
+  <Edit>DocumentLibraryForm</Edit>
+  <New>DocumentLibraryForm</New>
+</FormTemplates>
+</file>
+
+<file path=customXml/item2.xml><?xml version="1.0" encoding="utf-8"?>
 <ct:contentTypeSchema xmlns:ct="http://schemas.microsoft.com/office/2006/metadata/contentType" xmlns:ma="http://schemas.microsoft.com/office/2006/metadata/properties/metaAttributes" ct:_="" ma:_="" ma:contentTypeName="문서" ma:contentTypeID="0x010100724BE246D5096A49A61468620B4F694C" ma:contentTypeVersion="2" ma:contentTypeDescription="새 문서를 만듭니다." ma:contentTypeScope="" ma:versionID="ffc1fd754d50385c74eaa0c429a23f87">
   <xsd:schema xmlns:xsd="http://www.w3.org/2001/XMLSchema" xmlns:xs="http://www.w3.org/2001/XMLSchema" xmlns:p="http://schemas.microsoft.com/office/2006/metadata/properties" xmlns:ns3="0e4de794-19e7-4a03-8a25-6601fbe4a2ad" targetNamespace="http://schemas.microsoft.com/office/2006/metadata/properties" ma:root="true" ma:fieldsID="37d4eeb6abfbeb3504662c7bbcc66b17" ns3:_="">
     <xsd:import namespace="0e4de794-19e7-4a03-8a25-6601fbe4a2ad"/>
@@ -19890,15 +19903,6 @@
 </ct:contentTypeSchema>
 </file>
 
-<file path=customXml/item2.xml><?xml version="1.0" encoding="utf-8"?>
-<?mso-contentType ?>
-<FormTemplates xmlns="http://schemas.microsoft.com/sharepoint/v3/contenttype/forms">
-  <Display>DocumentLibraryForm</Display>
-  <Edit>DocumentLibraryForm</Edit>
-  <New>DocumentLibraryForm</New>
-</FormTemplates>
-</file>
-
 <file path=customXml/item3.xml><?xml version="1.0" encoding="utf-8"?>
 <p:properties xmlns:p="http://schemas.microsoft.com/office/2006/metadata/properties" xmlns:xsi="http://www.w3.org/2001/XMLSchema-instance" xmlns:pc="http://schemas.microsoft.com/office/infopath/2007/PartnerControls">
   <documentManagement/>
@@ -19906,6 +19910,14 @@
 </file>
 
 <file path=customXml/itemProps1.xml><?xml version="1.0" encoding="utf-8"?>
+<ds:datastoreItem xmlns:ds="http://schemas.openxmlformats.org/officeDocument/2006/customXml" ds:itemID="{B94506D1-FFA9-47EE-B148-AFA604BEB1B8}">
+  <ds:schemaRefs>
+    <ds:schemaRef ds:uri="http://schemas.microsoft.com/sharepoint/v3/contenttype/forms"/>
+  </ds:schemaRefs>
+</ds:datastoreItem>
+</file>
+
+<file path=customXml/itemProps2.xml><?xml version="1.0" encoding="utf-8"?>
 <ds:datastoreItem xmlns:ds="http://schemas.openxmlformats.org/officeDocument/2006/customXml" ds:itemID="{08C9C6FB-1032-40F6-99A4-A36D9F16D83B}">
   <ds:schemaRefs>
     <ds:schemaRef ds:uri="http://schemas.microsoft.com/office/2006/metadata/contentType"/>
@@ -19924,14 +19936,6 @@
 </ds:datastoreItem>
 </file>
 
-<file path=customXml/itemProps2.xml><?xml version="1.0" encoding="utf-8"?>
-<ds:datastoreItem xmlns:ds="http://schemas.openxmlformats.org/officeDocument/2006/customXml" ds:itemID="{B94506D1-FFA9-47EE-B148-AFA604BEB1B8}">
-  <ds:schemaRefs>
-    <ds:schemaRef ds:uri="http://schemas.microsoft.com/sharepoint/v3/contenttype/forms"/>
-  </ds:schemaRefs>
-</ds:datastoreItem>
-</file>
-
 <file path=customXml/itemProps3.xml><?xml version="1.0" encoding="utf-8"?>
 <ds:datastoreItem xmlns:ds="http://schemas.openxmlformats.org/officeDocument/2006/customXml" ds:itemID="{78B8425E-138E-4BE1-A1A1-DEAF16F7CC80}">
   <ds:schemaRefs>

</xml_diff>

<commit_message>
Edit chapter03,04 course materials
</commit_message>
<xml_diff>
--- a/Course Materials/Chapter03_Pytorch_Basics.pptx
+++ b/Course Materials/Chapter03_Pytorch_Basics.pptx
@@ -5,7 +5,7 @@
     <p:sldMasterId id="2147483648" r:id="rId4"/>
   </p:sldMasterIdLst>
   <p:notesMasterIdLst>
-    <p:notesMasterId r:id="rId57"/>
+    <p:notesMasterId r:id="rId58"/>
   </p:notesMasterIdLst>
   <p:sldIdLst>
     <p:sldId id="301" r:id="rId5"/>
@@ -60,6 +60,7 @@
     <p:sldId id="353" r:id="rId54"/>
     <p:sldId id="354" r:id="rId55"/>
     <p:sldId id="342" r:id="rId56"/>
+    <p:sldId id="355" r:id="rId57"/>
   </p:sldIdLst>
   <p:sldSz cx="12192000" cy="6858000"/>
   <p:notesSz cx="6858000" cy="9144000"/>
@@ -18499,6 +18500,100 @@
     <p:extLst>
       <p:ext uri="{BB962C8B-B14F-4D97-AF65-F5344CB8AC3E}">
         <p14:creationId xmlns:p14="http://schemas.microsoft.com/office/powerpoint/2010/main" val="564243733"/>
+      </p:ext>
+    </p:extLst>
+  </p:cSld>
+  <p:clrMapOvr>
+    <a:masterClrMapping/>
+  </p:clrMapOvr>
+</p:sld>
+</file>
+
+<file path=ppt/slides/slide53.xml><?xml version="1.0" encoding="utf-8"?>
+<p:sld xmlns:a="http://schemas.openxmlformats.org/drawingml/2006/main" xmlns:r="http://schemas.openxmlformats.org/officeDocument/2006/relationships" xmlns:p="http://schemas.openxmlformats.org/presentationml/2006/main">
+  <p:cSld>
+    <p:spTree>
+      <p:nvGrpSpPr>
+        <p:cNvPr id="1" name=""/>
+        <p:cNvGrpSpPr/>
+        <p:nvPr/>
+      </p:nvGrpSpPr>
+      <p:grpSpPr>
+        <a:xfrm>
+          <a:off x="0" y="0"/>
+          <a:ext cx="0" cy="0"/>
+          <a:chOff x="0" y="0"/>
+          <a:chExt cx="0" cy="0"/>
+        </a:xfrm>
+      </p:grpSpPr>
+      <p:sp>
+        <p:nvSpPr>
+          <p:cNvPr id="4" name="제목 3">
+            <a:extLst>
+              <a:ext uri="{FF2B5EF4-FFF2-40B4-BE49-F238E27FC236}">
+                <a16:creationId xmlns:a16="http://schemas.microsoft.com/office/drawing/2014/main" id="{B1680E60-E58C-4D50-A6B0-C5E6D6B4AAD5}"/>
+              </a:ext>
+            </a:extLst>
+          </p:cNvPr>
+          <p:cNvSpPr>
+            <a:spLocks noGrp="1"/>
+          </p:cNvSpPr>
+          <p:nvPr>
+            <p:ph type="title"/>
+          </p:nvPr>
+        </p:nvSpPr>
+        <p:spPr>
+          <a:xfrm>
+            <a:off x="831850" y="2077085"/>
+            <a:ext cx="10515600" cy="1351915"/>
+          </a:xfrm>
+        </p:spPr>
+        <p:txBody>
+          <a:bodyPr/>
+          <a:lstStyle/>
+          <a:p>
+            <a:pPr algn="ctr"/>
+            <a:r>
+              <a:rPr lang="ko-KR" altLang="en-US" dirty="0"/>
+              <a:t>수고하셨습니다</a:t>
+            </a:r>
+            <a:r>
+              <a:rPr lang="en-US" altLang="ko-KR" dirty="0"/>
+              <a:t>!</a:t>
+            </a:r>
+            <a:endParaRPr lang="ko-KR" altLang="en-US" dirty="0"/>
+          </a:p>
+        </p:txBody>
+      </p:sp>
+      <p:sp>
+        <p:nvSpPr>
+          <p:cNvPr id="5" name="텍스트 개체 틀 4">
+            <a:extLst>
+              <a:ext uri="{FF2B5EF4-FFF2-40B4-BE49-F238E27FC236}">
+                <a16:creationId xmlns:a16="http://schemas.microsoft.com/office/drawing/2014/main" id="{48B64242-ABA7-4080-9386-1D8C0E1009E5}"/>
+              </a:ext>
+            </a:extLst>
+          </p:cNvPr>
+          <p:cNvSpPr>
+            <a:spLocks noGrp="1"/>
+          </p:cNvSpPr>
+          <p:nvPr>
+            <p:ph type="body" idx="1"/>
+          </p:nvPr>
+        </p:nvSpPr>
+        <p:spPr/>
+        <p:txBody>
+          <a:bodyPr/>
+          <a:lstStyle/>
+          <a:p>
+            <a:endParaRPr lang="ko-KR" altLang="en-US"/>
+          </a:p>
+        </p:txBody>
+      </p:sp>
+    </p:spTree>
+    <p:extLst>
+      <p:ext uri="{BB962C8B-B14F-4D97-AF65-F5344CB8AC3E}">
+        <p14:creationId xmlns:p14="http://schemas.microsoft.com/office/powerpoint/2010/main" val="3912238185"/>
       </p:ext>
     </p:extLst>
   </p:cSld>
@@ -19763,15 +19858,6 @@
 </file>
 
 <file path=customXml/item1.xml><?xml version="1.0" encoding="utf-8"?>
-<?mso-contentType ?>
-<FormTemplates xmlns="http://schemas.microsoft.com/sharepoint/v3/contenttype/forms">
-  <Display>DocumentLibraryForm</Display>
-  <Edit>DocumentLibraryForm</Edit>
-  <New>DocumentLibraryForm</New>
-</FormTemplates>
-</file>
-
-<file path=customXml/item2.xml><?xml version="1.0" encoding="utf-8"?>
 <ct:contentTypeSchema xmlns:ct="http://schemas.microsoft.com/office/2006/metadata/contentType" xmlns:ma="http://schemas.microsoft.com/office/2006/metadata/properties/metaAttributes" ct:_="" ma:_="" ma:contentTypeName="문서" ma:contentTypeID="0x010100724BE246D5096A49A61468620B4F694C" ma:contentTypeVersion="2" ma:contentTypeDescription="새 문서를 만듭니다." ma:contentTypeScope="" ma:versionID="ffc1fd754d50385c74eaa0c429a23f87">
   <xsd:schema xmlns:xsd="http://www.w3.org/2001/XMLSchema" xmlns:xs="http://www.w3.org/2001/XMLSchema" xmlns:p="http://schemas.microsoft.com/office/2006/metadata/properties" xmlns:ns3="0e4de794-19e7-4a03-8a25-6601fbe4a2ad" targetNamespace="http://schemas.microsoft.com/office/2006/metadata/properties" ma:root="true" ma:fieldsID="37d4eeb6abfbeb3504662c7bbcc66b17" ns3:_="">
     <xsd:import namespace="0e4de794-19e7-4a03-8a25-6601fbe4a2ad"/>
@@ -19903,6 +19989,15 @@
 </ct:contentTypeSchema>
 </file>
 
+<file path=customXml/item2.xml><?xml version="1.0" encoding="utf-8"?>
+<?mso-contentType ?>
+<FormTemplates xmlns="http://schemas.microsoft.com/sharepoint/v3/contenttype/forms">
+  <Display>DocumentLibraryForm</Display>
+  <Edit>DocumentLibraryForm</Edit>
+  <New>DocumentLibraryForm</New>
+</FormTemplates>
+</file>
+
 <file path=customXml/item3.xml><?xml version="1.0" encoding="utf-8"?>
 <p:properties xmlns:p="http://schemas.microsoft.com/office/2006/metadata/properties" xmlns:xsi="http://www.w3.org/2001/XMLSchema-instance" xmlns:pc="http://schemas.microsoft.com/office/infopath/2007/PartnerControls">
   <documentManagement/>
@@ -19910,14 +20005,6 @@
 </file>
 
 <file path=customXml/itemProps1.xml><?xml version="1.0" encoding="utf-8"?>
-<ds:datastoreItem xmlns:ds="http://schemas.openxmlformats.org/officeDocument/2006/customXml" ds:itemID="{B94506D1-FFA9-47EE-B148-AFA604BEB1B8}">
-  <ds:schemaRefs>
-    <ds:schemaRef ds:uri="http://schemas.microsoft.com/sharepoint/v3/contenttype/forms"/>
-  </ds:schemaRefs>
-</ds:datastoreItem>
-</file>
-
-<file path=customXml/itemProps2.xml><?xml version="1.0" encoding="utf-8"?>
 <ds:datastoreItem xmlns:ds="http://schemas.openxmlformats.org/officeDocument/2006/customXml" ds:itemID="{08C9C6FB-1032-40F6-99A4-A36D9F16D83B}">
   <ds:schemaRefs>
     <ds:schemaRef ds:uri="http://schemas.microsoft.com/office/2006/metadata/contentType"/>
@@ -19936,6 +20023,14 @@
 </ds:datastoreItem>
 </file>
 
+<file path=customXml/itemProps2.xml><?xml version="1.0" encoding="utf-8"?>
+<ds:datastoreItem xmlns:ds="http://schemas.openxmlformats.org/officeDocument/2006/customXml" ds:itemID="{B94506D1-FFA9-47EE-B148-AFA604BEB1B8}">
+  <ds:schemaRefs>
+    <ds:schemaRef ds:uri="http://schemas.microsoft.com/sharepoint/v3/contenttype/forms"/>
+  </ds:schemaRefs>
+</ds:datastoreItem>
+</file>
+
 <file path=customXml/itemProps3.xml><?xml version="1.0" encoding="utf-8"?>
 <ds:datastoreItem xmlns:ds="http://schemas.openxmlformats.org/officeDocument/2006/customXml" ds:itemID="{78B8425E-138E-4BE1-A1A1-DEAF16F7CC80}">
   <ds:schemaRefs>

</xml_diff>